<commit_message>
Update PowerPoint themes and sample output
</commit_message>
<xml_diff>
--- a/scripts/includes/theme.pptx
+++ b/scripts/includes/theme.pptx
@@ -212,7 +212,7 @@
           <a:p>
             <a:fld id="{728AA843-2E0F-4143-82E9-3671A2E63393}" type="datetimeFigureOut">
               <a:rPr lang="en-CA" smtClean="0"/>
-              <a:t>2023-11-04</a:t>
+              <a:t>2023-11-10</a:t>
             </a:fld>
             <a:endParaRPr lang="en-CA"/>
           </a:p>
@@ -456,7 +456,7 @@
           <a:p>
             <a:fld id="{D220F1D1-6C19-4F4B-92BA-F04860C94A09}" type="datetimeFigureOut">
               <a:rPr lang="en-CA" smtClean="0"/>
-              <a:t>2023-11-04</a:t>
+              <a:t>2023-11-10</a:t>
             </a:fld>
             <a:endParaRPr lang="en-CA"/>
           </a:p>
@@ -656,7 +656,7 @@
           <a:p>
             <a:fld id="{D220F1D1-6C19-4F4B-92BA-F04860C94A09}" type="datetimeFigureOut">
               <a:rPr lang="en-CA" smtClean="0"/>
-              <a:t>2023-11-04</a:t>
+              <a:t>2023-11-10</a:t>
             </a:fld>
             <a:endParaRPr lang="en-CA"/>
           </a:p>
@@ -866,7 +866,7 @@
           <a:p>
             <a:fld id="{D220F1D1-6C19-4F4B-92BA-F04860C94A09}" type="datetimeFigureOut">
               <a:rPr lang="en-CA" smtClean="0"/>
-              <a:t>2023-11-04</a:t>
+              <a:t>2023-11-10</a:t>
             </a:fld>
             <a:endParaRPr lang="en-CA"/>
           </a:p>
@@ -1073,7 +1073,7 @@
           <a:p>
             <a:fld id="{D220F1D1-6C19-4F4B-92BA-F04860C94A09}" type="datetimeFigureOut">
               <a:rPr lang="en-CA" smtClean="0"/>
-              <a:t>2023-11-04</a:t>
+              <a:t>2023-11-10</a:t>
             </a:fld>
             <a:endParaRPr lang="en-CA"/>
           </a:p>
@@ -1172,7 +1172,7 @@
           </a:bodyPr>
           <a:lstStyle>
             <a:lvl1pPr algn="ctr">
-              <a:defRPr sz="3200"/>
+              <a:defRPr sz="3600"/>
             </a:lvl1pPr>
           </a:lstStyle>
           <a:p>
@@ -1400,7 +1400,7 @@
           <a:p>
             <a:fld id="{D220F1D1-6C19-4F4B-92BA-F04860C94A09}" type="datetimeFigureOut">
               <a:rPr lang="en-CA" smtClean="0"/>
-              <a:t>2023-11-04</a:t>
+              <a:t>2023-11-10</a:t>
             </a:fld>
             <a:endParaRPr lang="en-CA"/>
           </a:p>
@@ -1716,7 +1716,7 @@
           <a:p>
             <a:fld id="{D220F1D1-6C19-4F4B-92BA-F04860C94A09}" type="datetimeFigureOut">
               <a:rPr lang="en-CA" smtClean="0"/>
-              <a:t>2023-11-04</a:t>
+              <a:t>2023-11-10</a:t>
             </a:fld>
             <a:endParaRPr lang="en-CA"/>
           </a:p>
@@ -2141,7 +2141,7 @@
           <a:p>
             <a:fld id="{D220F1D1-6C19-4F4B-92BA-F04860C94A09}" type="datetimeFigureOut">
               <a:rPr lang="en-CA" smtClean="0"/>
-              <a:t>2023-11-04</a:t>
+              <a:t>2023-11-10</a:t>
             </a:fld>
             <a:endParaRPr lang="en-CA"/>
           </a:p>
@@ -2283,7 +2283,7 @@
           <a:p>
             <a:fld id="{D220F1D1-6C19-4F4B-92BA-F04860C94A09}" type="datetimeFigureOut">
               <a:rPr lang="en-CA" smtClean="0"/>
-              <a:t>2023-11-04</a:t>
+              <a:t>2023-11-10</a:t>
             </a:fld>
             <a:endParaRPr lang="en-CA"/>
           </a:p>
@@ -2396,7 +2396,7 @@
           <a:p>
             <a:fld id="{D220F1D1-6C19-4F4B-92BA-F04860C94A09}" type="datetimeFigureOut">
               <a:rPr lang="en-CA" smtClean="0"/>
-              <a:t>2023-11-04</a:t>
+              <a:t>2023-11-10</a:t>
             </a:fld>
             <a:endParaRPr lang="en-CA"/>
           </a:p>
@@ -2709,7 +2709,7 @@
           <a:p>
             <a:fld id="{D220F1D1-6C19-4F4B-92BA-F04860C94A09}" type="datetimeFigureOut">
               <a:rPr lang="en-CA" smtClean="0"/>
-              <a:t>2023-11-04</a:t>
+              <a:t>2023-11-10</a:t>
             </a:fld>
             <a:endParaRPr lang="en-CA"/>
           </a:p>
@@ -2998,7 +2998,7 @@
           <a:p>
             <a:fld id="{D220F1D1-6C19-4F4B-92BA-F04860C94A09}" type="datetimeFigureOut">
               <a:rPr lang="en-CA" smtClean="0"/>
-              <a:t>2023-11-04</a:t>
+              <a:t>2023-11-10</a:t>
             </a:fld>
             <a:endParaRPr lang="en-CA"/>
           </a:p>
@@ -3251,7 +3251,7 @@
           <a:p>
             <a:fld id="{D220F1D1-6C19-4F4B-92BA-F04860C94A09}" type="datetimeFigureOut">
               <a:rPr lang="en-CA" smtClean="0"/>
-              <a:t>2023-11-04</a:t>
+              <a:t>2023-11-10</a:t>
             </a:fld>
             <a:endParaRPr lang="en-CA"/>
           </a:p>

</xml_diff>

<commit_message>
Update themes and sample output
</commit_message>
<xml_diff>
--- a/scripts/includes/theme.pptx
+++ b/scripts/includes/theme.pptx
@@ -212,7 +212,7 @@
           <a:p>
             <a:fld id="{728AA843-2E0F-4143-82E9-3671A2E63393}" type="datetimeFigureOut">
               <a:rPr lang="en-CA" smtClean="0"/>
-              <a:t>2023-11-10</a:t>
+              <a:t>2024-01-07</a:t>
             </a:fld>
             <a:endParaRPr lang="en-CA"/>
           </a:p>
@@ -456,7 +456,7 @@
           <a:p>
             <a:fld id="{D220F1D1-6C19-4F4B-92BA-F04860C94A09}" type="datetimeFigureOut">
               <a:rPr lang="en-CA" smtClean="0"/>
-              <a:t>2023-11-10</a:t>
+              <a:t>2024-01-07</a:t>
             </a:fld>
             <a:endParaRPr lang="en-CA"/>
           </a:p>
@@ -656,7 +656,7 @@
           <a:p>
             <a:fld id="{D220F1D1-6C19-4F4B-92BA-F04860C94A09}" type="datetimeFigureOut">
               <a:rPr lang="en-CA" smtClean="0"/>
-              <a:t>2023-11-10</a:t>
+              <a:t>2024-01-07</a:t>
             </a:fld>
             <a:endParaRPr lang="en-CA"/>
           </a:p>
@@ -866,7 +866,7 @@
           <a:p>
             <a:fld id="{D220F1D1-6C19-4F4B-92BA-F04860C94A09}" type="datetimeFigureOut">
               <a:rPr lang="en-CA" smtClean="0"/>
-              <a:t>2023-11-10</a:t>
+              <a:t>2024-01-07</a:t>
             </a:fld>
             <a:endParaRPr lang="en-CA"/>
           </a:p>
@@ -1073,7 +1073,7 @@
           <a:p>
             <a:fld id="{D220F1D1-6C19-4F4B-92BA-F04860C94A09}" type="datetimeFigureOut">
               <a:rPr lang="en-CA" smtClean="0"/>
-              <a:t>2023-11-10</a:t>
+              <a:t>2024-01-07</a:t>
             </a:fld>
             <a:endParaRPr lang="en-CA"/>
           </a:p>
@@ -1097,7 +1097,7 @@
         </p:nvSpPr>
         <p:spPr>
           <a:xfrm>
-            <a:off x="5410199" y="6357600"/>
+            <a:off x="4038600" y="6357600"/>
             <a:ext cx="4114800" cy="363600"/>
           </a:xfrm>
         </p:spPr>
@@ -1400,7 +1400,7 @@
           <a:p>
             <a:fld id="{D220F1D1-6C19-4F4B-92BA-F04860C94A09}" type="datetimeFigureOut">
               <a:rPr lang="en-CA" smtClean="0"/>
-              <a:t>2023-11-10</a:t>
+              <a:t>2024-01-07</a:t>
             </a:fld>
             <a:endParaRPr lang="en-CA"/>
           </a:p>
@@ -1716,7 +1716,7 @@
           <a:p>
             <a:fld id="{D220F1D1-6C19-4F4B-92BA-F04860C94A09}" type="datetimeFigureOut">
               <a:rPr lang="en-CA" smtClean="0"/>
-              <a:t>2023-11-10</a:t>
+              <a:t>2024-01-07</a:t>
             </a:fld>
             <a:endParaRPr lang="en-CA"/>
           </a:p>
@@ -1740,7 +1740,7 @@
         </p:nvSpPr>
         <p:spPr>
           <a:xfrm>
-            <a:off x="5410198" y="6356791"/>
+            <a:off x="4038600" y="6356789"/>
             <a:ext cx="4114800" cy="365125"/>
           </a:xfrm>
         </p:spPr>
@@ -1843,10 +1843,10 @@
           <a:lstStyle/>
           <a:p>
             <a:r>
-              <a:rPr lang="en-US"/>
+              <a:rPr lang="en-US" dirty="0"/>
               <a:t>Click to edit Master title style</a:t>
             </a:r>
-            <a:endParaRPr lang="en-CA"/>
+            <a:endParaRPr lang="en-CA" dirty="0"/>
           </a:p>
         </p:txBody>
       </p:sp>
@@ -2141,7 +2141,7 @@
           <a:p>
             <a:fld id="{D220F1D1-6C19-4F4B-92BA-F04860C94A09}" type="datetimeFigureOut">
               <a:rPr lang="en-CA" smtClean="0"/>
-              <a:t>2023-11-10</a:t>
+              <a:t>2024-01-07</a:t>
             </a:fld>
             <a:endParaRPr lang="en-CA"/>
           </a:p>
@@ -2253,10 +2253,10 @@
           <a:lstStyle/>
           <a:p>
             <a:r>
-              <a:rPr lang="en-US"/>
+              <a:rPr lang="en-US" dirty="0"/>
               <a:t>Click to edit Master title style</a:t>
             </a:r>
-            <a:endParaRPr lang="en-CA"/>
+            <a:endParaRPr lang="en-CA" dirty="0"/>
           </a:p>
         </p:txBody>
       </p:sp>
@@ -2283,7 +2283,7 @@
           <a:p>
             <a:fld id="{D220F1D1-6C19-4F4B-92BA-F04860C94A09}" type="datetimeFigureOut">
               <a:rPr lang="en-CA" smtClean="0"/>
-              <a:t>2023-11-10</a:t>
+              <a:t>2024-01-07</a:t>
             </a:fld>
             <a:endParaRPr lang="en-CA"/>
           </a:p>
@@ -2396,7 +2396,7 @@
           <a:p>
             <a:fld id="{D220F1D1-6C19-4F4B-92BA-F04860C94A09}" type="datetimeFigureOut">
               <a:rPr lang="en-CA" smtClean="0"/>
-              <a:t>2023-11-10</a:t>
+              <a:t>2024-01-07</a:t>
             </a:fld>
             <a:endParaRPr lang="en-CA"/>
           </a:p>
@@ -2509,18 +2509,20 @@
           </a:xfrm>
         </p:spPr>
         <p:txBody>
-          <a:bodyPr anchor="b"/>
+          <a:bodyPr anchor="b">
+            <a:normAutofit/>
+          </a:bodyPr>
           <a:lstStyle>
             <a:lvl1pPr>
-              <a:defRPr sz="3200"/>
+              <a:defRPr sz="3600"/>
             </a:lvl1pPr>
           </a:lstStyle>
           <a:p>
             <a:r>
-              <a:rPr lang="en-US"/>
+              <a:rPr lang="en-US" dirty="0"/>
               <a:t>Click to edit Master title style</a:t>
             </a:r>
-            <a:endParaRPr lang="en-CA"/>
+            <a:endParaRPr lang="en-CA" dirty="0"/>
           </a:p>
         </p:txBody>
       </p:sp>
@@ -2542,8 +2544,8 @@
         </p:nvSpPr>
         <p:spPr>
           <a:xfrm>
-            <a:off x="5183188" y="987425"/>
-            <a:ext cx="6172200" cy="4873625"/>
+            <a:off x="4772025" y="457200"/>
+            <a:ext cx="6583363" cy="5411787"/>
           </a:xfrm>
         </p:spPr>
         <p:txBody>
@@ -2638,11 +2640,13 @@
           </a:xfrm>
         </p:spPr>
         <p:txBody>
-          <a:bodyPr/>
+          <a:bodyPr>
+            <a:normAutofit/>
+          </a:bodyPr>
           <a:lstStyle>
             <a:lvl1pPr marL="0" indent="0">
               <a:buNone/>
-              <a:defRPr sz="1600"/>
+              <a:defRPr sz="2000"/>
             </a:lvl1pPr>
             <a:lvl2pPr marL="457200" indent="0">
               <a:buNone/>
@@ -2680,7 +2684,7 @@
           <a:p>
             <a:pPr lvl="0"/>
             <a:r>
-              <a:rPr lang="en-US"/>
+              <a:rPr lang="en-US" dirty="0"/>
               <a:t>Click to edit Master text styles</a:t>
             </a:r>
           </a:p>
@@ -2709,7 +2713,7 @@
           <a:p>
             <a:fld id="{D220F1D1-6C19-4F4B-92BA-F04860C94A09}" type="datetimeFigureOut">
               <a:rPr lang="en-CA" smtClean="0"/>
-              <a:t>2023-11-10</a:t>
+              <a:t>2024-01-07</a:t>
             </a:fld>
             <a:endParaRPr lang="en-CA"/>
           </a:p>
@@ -2822,18 +2826,20 @@
           </a:xfrm>
         </p:spPr>
         <p:txBody>
-          <a:bodyPr anchor="b"/>
+          <a:bodyPr anchor="b">
+            <a:normAutofit/>
+          </a:bodyPr>
           <a:lstStyle>
             <a:lvl1pPr>
-              <a:defRPr sz="3200"/>
+              <a:defRPr sz="3600"/>
             </a:lvl1pPr>
           </a:lstStyle>
           <a:p>
             <a:r>
-              <a:rPr lang="en-US"/>
+              <a:rPr lang="en-US" dirty="0"/>
               <a:t>Click to edit Master title style</a:t>
             </a:r>
-            <a:endParaRPr lang="en-CA"/>
+            <a:endParaRPr lang="en-CA" dirty="0"/>
           </a:p>
         </p:txBody>
       </p:sp>
@@ -2931,7 +2937,7 @@
           <a:lstStyle>
             <a:lvl1pPr marL="0" indent="0">
               <a:buNone/>
-              <a:defRPr sz="1600"/>
+              <a:defRPr sz="2000"/>
             </a:lvl1pPr>
             <a:lvl2pPr marL="457200" indent="0">
               <a:buNone/>
@@ -2969,7 +2975,7 @@
           <a:p>
             <a:pPr lvl="0"/>
             <a:r>
-              <a:rPr lang="en-US"/>
+              <a:rPr lang="en-US" dirty="0"/>
               <a:t>Click to edit Master text styles</a:t>
             </a:r>
           </a:p>
@@ -2998,7 +3004,7 @@
           <a:p>
             <a:fld id="{D220F1D1-6C19-4F4B-92BA-F04860C94A09}" type="datetimeFigureOut">
               <a:rPr lang="en-CA" smtClean="0"/>
-              <a:t>2023-11-10</a:t>
+              <a:t>2024-01-07</a:t>
             </a:fld>
             <a:endParaRPr lang="en-CA"/>
           </a:p>
@@ -3022,7 +3028,7 @@
         </p:nvSpPr>
         <p:spPr>
           <a:xfrm>
-            <a:off x="5410994" y="6349221"/>
+            <a:off x="4038600" y="6356350"/>
             <a:ext cx="4114800" cy="365125"/>
           </a:xfrm>
         </p:spPr>
@@ -3251,7 +3257,7 @@
           <a:p>
             <a:fld id="{D220F1D1-6C19-4F4B-92BA-F04860C94A09}" type="datetimeFigureOut">
               <a:rPr lang="en-CA" smtClean="0"/>
-              <a:t>2023-11-10</a:t>
+              <a:t>2024-01-07</a:t>
             </a:fld>
             <a:endParaRPr lang="en-CA"/>
           </a:p>

</xml_diff>